<commit_message>
Started Making the Board
</commit_message>
<xml_diff>
--- a/Pictures/Pictures.pptx
+++ b/Pictures/Pictures.pptx
@@ -5,7 +5,7 @@
     <p:sldMasterId id="2147483648" r:id="rId1"/>
   </p:sldMasterIdLst>
   <p:notesMasterIdLst>
-    <p:notesMasterId r:id="rId39"/>
+    <p:notesMasterId r:id="rId41"/>
   </p:notesMasterIdLst>
   <p:sldIdLst>
     <p:sldId id="256" r:id="rId2"/>
@@ -44,7 +44,9 @@
     <p:sldId id="291" r:id="rId35"/>
     <p:sldId id="288" r:id="rId36"/>
     <p:sldId id="292" r:id="rId37"/>
-    <p:sldId id="257" r:id="rId38"/>
+    <p:sldId id="293" r:id="rId38"/>
+    <p:sldId id="294" r:id="rId39"/>
+    <p:sldId id="257" r:id="rId40"/>
   </p:sldIdLst>
   <p:sldSz cx="9144000" cy="6858000" type="screen4x3"/>
   <p:notesSz cx="6858000" cy="9144000"/>
@@ -561,7 +563,7 @@
           <a:p>
             <a:fld id="{59E917ED-6ECC-B444-A1F4-2F4F0C4F768C}" type="slidenum">
               <a:rPr lang="en-US" smtClean="0"/>
-              <a:t>37</a:t>
+              <a:t>39</a:t>
             </a:fld>
             <a:endParaRPr lang="en-US"/>
           </a:p>
@@ -14915,6 +14917,270 @@
 </file>
 
 <file path=ppt/slides/slide37.xml><?xml version="1.0" encoding="utf-8"?>
+<p:sld xmlns:a="http://schemas.openxmlformats.org/drawingml/2006/main" xmlns:r="http://schemas.openxmlformats.org/officeDocument/2006/relationships" xmlns:p="http://schemas.openxmlformats.org/presentationml/2006/main">
+  <p:cSld>
+    <p:bg>
+      <p:bgPr>
+        <a:solidFill>
+          <a:schemeClr val="tx1">
+            <a:lumMod val="50000"/>
+            <a:lumOff val="50000"/>
+          </a:schemeClr>
+        </a:solidFill>
+        <a:effectLst/>
+      </p:bgPr>
+    </p:bg>
+    <p:spTree>
+      <p:nvGrpSpPr>
+        <p:cNvPr id="1" name=""/>
+        <p:cNvGrpSpPr/>
+        <p:nvPr/>
+      </p:nvGrpSpPr>
+      <p:grpSpPr>
+        <a:xfrm>
+          <a:off x="0" y="0"/>
+          <a:ext cx="0" cy="0"/>
+          <a:chOff x="0" y="0"/>
+          <a:chExt cx="0" cy="0"/>
+        </a:xfrm>
+      </p:grpSpPr>
+      <p:sp>
+        <p:nvSpPr>
+          <p:cNvPr id="2" name="Rectangle 1"/>
+          <p:cNvSpPr/>
+          <p:nvPr/>
+        </p:nvSpPr>
+        <p:spPr>
+          <a:xfrm>
+            <a:off x="1149047" y="0"/>
+            <a:ext cx="6858000" cy="6858000"/>
+          </a:xfrm>
+          <a:prstGeom prst="rect">
+            <a:avLst/>
+          </a:prstGeom>
+          <a:noFill/>
+          <a:ln>
+            <a:noFill/>
+          </a:ln>
+          <a:effectLst/>
+        </p:spPr>
+        <p:style>
+          <a:lnRef idx="1">
+            <a:schemeClr val="accent1"/>
+          </a:lnRef>
+          <a:fillRef idx="3">
+            <a:schemeClr val="accent1"/>
+          </a:fillRef>
+          <a:effectRef idx="2">
+            <a:schemeClr val="accent1"/>
+          </a:effectRef>
+          <a:fontRef idx="minor">
+            <a:schemeClr val="lt1"/>
+          </a:fontRef>
+        </p:style>
+        <p:txBody>
+          <a:bodyPr rtlCol="0" anchor="ctr"/>
+          <a:lstStyle/>
+          <a:p>
+            <a:pPr algn="ctr"/>
+            <a:endParaRPr lang="en-US" dirty="0"/>
+          </a:p>
+        </p:txBody>
+      </p:sp>
+      <p:sp>
+        <p:nvSpPr>
+          <p:cNvPr id="3" name="Oval 2"/>
+          <p:cNvSpPr/>
+          <p:nvPr/>
+        </p:nvSpPr>
+        <p:spPr>
+          <a:xfrm>
+            <a:off x="3797904" y="2648857"/>
+            <a:ext cx="1548190" cy="1548190"/>
+          </a:xfrm>
+          <a:prstGeom prst="ellipse">
+            <a:avLst/>
+          </a:prstGeom>
+          <a:solidFill>
+            <a:schemeClr val="bg1"/>
+          </a:solidFill>
+          <a:ln>
+            <a:solidFill>
+              <a:srgbClr val="FFFFFF"/>
+            </a:solidFill>
+          </a:ln>
+          <a:effectLst/>
+        </p:spPr>
+        <p:style>
+          <a:lnRef idx="1">
+            <a:schemeClr val="accent1"/>
+          </a:lnRef>
+          <a:fillRef idx="3">
+            <a:schemeClr val="accent1"/>
+          </a:fillRef>
+          <a:effectRef idx="2">
+            <a:schemeClr val="accent1"/>
+          </a:effectRef>
+          <a:fontRef idx="minor">
+            <a:schemeClr val="lt1"/>
+          </a:fontRef>
+        </p:style>
+        <p:txBody>
+          <a:bodyPr rtlCol="0" anchor="ctr"/>
+          <a:lstStyle/>
+          <a:p>
+            <a:pPr algn="ctr"/>
+            <a:endParaRPr lang="en-US"/>
+          </a:p>
+        </p:txBody>
+      </p:sp>
+    </p:spTree>
+    <p:extLst>
+      <p:ext uri="{BB962C8B-B14F-4D97-AF65-F5344CB8AC3E}">
+        <p14:creationId xmlns:p14="http://schemas.microsoft.com/office/powerpoint/2010/main" val="2320658216"/>
+      </p:ext>
+    </p:extLst>
+  </p:cSld>
+  <p:clrMapOvr>
+    <a:masterClrMapping/>
+  </p:clrMapOvr>
+</p:sld>
+</file>
+
+<file path=ppt/slides/slide38.xml><?xml version="1.0" encoding="utf-8"?>
+<p:sld xmlns:a="http://schemas.openxmlformats.org/drawingml/2006/main" xmlns:r="http://schemas.openxmlformats.org/officeDocument/2006/relationships" xmlns:p="http://schemas.openxmlformats.org/presentationml/2006/main">
+  <p:cSld>
+    <p:bg>
+      <p:bgPr>
+        <a:solidFill>
+          <a:schemeClr val="tx1">
+            <a:lumMod val="50000"/>
+            <a:lumOff val="50000"/>
+          </a:schemeClr>
+        </a:solidFill>
+        <a:effectLst/>
+      </p:bgPr>
+    </p:bg>
+    <p:spTree>
+      <p:nvGrpSpPr>
+        <p:cNvPr id="1" name=""/>
+        <p:cNvGrpSpPr/>
+        <p:nvPr/>
+      </p:nvGrpSpPr>
+      <p:grpSpPr>
+        <a:xfrm>
+          <a:off x="0" y="0"/>
+          <a:ext cx="0" cy="0"/>
+          <a:chOff x="0" y="0"/>
+          <a:chExt cx="0" cy="0"/>
+        </a:xfrm>
+      </p:grpSpPr>
+      <p:sp>
+        <p:nvSpPr>
+          <p:cNvPr id="2" name="Rectangle 1"/>
+          <p:cNvSpPr/>
+          <p:nvPr/>
+        </p:nvSpPr>
+        <p:spPr>
+          <a:xfrm>
+            <a:off x="1149047" y="0"/>
+            <a:ext cx="6858000" cy="6858000"/>
+          </a:xfrm>
+          <a:prstGeom prst="rect">
+            <a:avLst/>
+          </a:prstGeom>
+          <a:noFill/>
+          <a:ln>
+            <a:noFill/>
+          </a:ln>
+          <a:effectLst/>
+        </p:spPr>
+        <p:style>
+          <a:lnRef idx="1">
+            <a:schemeClr val="accent1"/>
+          </a:lnRef>
+          <a:fillRef idx="3">
+            <a:schemeClr val="accent1"/>
+          </a:fillRef>
+          <a:effectRef idx="2">
+            <a:schemeClr val="accent1"/>
+          </a:effectRef>
+          <a:fontRef idx="minor">
+            <a:schemeClr val="lt1"/>
+          </a:fontRef>
+        </p:style>
+        <p:txBody>
+          <a:bodyPr rtlCol="0" anchor="ctr"/>
+          <a:lstStyle/>
+          <a:p>
+            <a:pPr algn="ctr"/>
+            <a:endParaRPr lang="en-US" dirty="0"/>
+          </a:p>
+        </p:txBody>
+      </p:sp>
+      <p:sp>
+        <p:nvSpPr>
+          <p:cNvPr id="3" name="Oval 2"/>
+          <p:cNvSpPr>
+            <a:spLocks noChangeAspect="1"/>
+          </p:cNvSpPr>
+          <p:nvPr/>
+        </p:nvSpPr>
+        <p:spPr>
+          <a:xfrm>
+            <a:off x="1338412" y="189365"/>
+            <a:ext cx="6467174" cy="6467174"/>
+          </a:xfrm>
+          <a:prstGeom prst="ellipse">
+            <a:avLst/>
+          </a:prstGeom>
+          <a:solidFill>
+            <a:schemeClr val="bg1"/>
+          </a:solidFill>
+          <a:ln>
+            <a:solidFill>
+              <a:srgbClr val="FFFFFF"/>
+            </a:solidFill>
+          </a:ln>
+          <a:effectLst/>
+        </p:spPr>
+        <p:style>
+          <a:lnRef idx="1">
+            <a:schemeClr val="accent1"/>
+          </a:lnRef>
+          <a:fillRef idx="3">
+            <a:schemeClr val="accent1"/>
+          </a:fillRef>
+          <a:effectRef idx="2">
+            <a:schemeClr val="accent1"/>
+          </a:effectRef>
+          <a:fontRef idx="minor">
+            <a:schemeClr val="lt1"/>
+          </a:fontRef>
+        </p:style>
+        <p:txBody>
+          <a:bodyPr rtlCol="0" anchor="ctr"/>
+          <a:lstStyle/>
+          <a:p>
+            <a:pPr algn="ctr"/>
+            <a:endParaRPr lang="en-US"/>
+          </a:p>
+        </p:txBody>
+      </p:sp>
+    </p:spTree>
+    <p:extLst>
+      <p:ext uri="{BB962C8B-B14F-4D97-AF65-F5344CB8AC3E}">
+        <p14:creationId xmlns:p14="http://schemas.microsoft.com/office/powerpoint/2010/main" val="369060116"/>
+      </p:ext>
+    </p:extLst>
+  </p:cSld>
+  <p:clrMapOvr>
+    <a:masterClrMapping/>
+  </p:clrMapOvr>
+</p:sld>
+</file>
+
+<file path=ppt/slides/slide39.xml><?xml version="1.0" encoding="utf-8"?>
 <p:sld xmlns:a="http://schemas.openxmlformats.org/drawingml/2006/main" xmlns:r="http://schemas.openxmlformats.org/officeDocument/2006/relationships" xmlns:p="http://schemas.openxmlformats.org/presentationml/2006/main">
   <p:cSld>
     <p:bg>

</xml_diff>